<commit_message>
changes on the first page
</commit_message>
<xml_diff>
--- a/Hackathlon Canteens.pptx
+++ b/Hackathlon Canteens.pptx
@@ -239,7 +239,7 @@
           <a:p>
             <a:fld id="{D20C4439-4D20-4F39-A54D-158889AA2034}" type="datetimeFigureOut">
               <a:rPr lang="nl-BE" smtClean="0"/>
-              <a:t>13/06/2015</a:t>
+              <a:t>13/06/15</a:t>
             </a:fld>
             <a:endParaRPr lang="nl-BE"/>
           </a:p>
@@ -409,7 +409,7 @@
           <a:p>
             <a:fld id="{D20C4439-4D20-4F39-A54D-158889AA2034}" type="datetimeFigureOut">
               <a:rPr lang="nl-BE" smtClean="0"/>
-              <a:t>13/06/2015</a:t>
+              <a:t>13/06/15</a:t>
             </a:fld>
             <a:endParaRPr lang="nl-BE"/>
           </a:p>
@@ -589,7 +589,7 @@
           <a:p>
             <a:fld id="{D20C4439-4D20-4F39-A54D-158889AA2034}" type="datetimeFigureOut">
               <a:rPr lang="nl-BE" smtClean="0"/>
-              <a:t>13/06/2015</a:t>
+              <a:t>13/06/15</a:t>
             </a:fld>
             <a:endParaRPr lang="nl-BE"/>
           </a:p>
@@ -759,7 +759,7 @@
           <a:p>
             <a:fld id="{D20C4439-4D20-4F39-A54D-158889AA2034}" type="datetimeFigureOut">
               <a:rPr lang="nl-BE" smtClean="0"/>
-              <a:t>13/06/2015</a:t>
+              <a:t>13/06/15</a:t>
             </a:fld>
             <a:endParaRPr lang="nl-BE"/>
           </a:p>
@@ -1005,7 +1005,7 @@
           <a:p>
             <a:fld id="{D20C4439-4D20-4F39-A54D-158889AA2034}" type="datetimeFigureOut">
               <a:rPr lang="nl-BE" smtClean="0"/>
-              <a:t>13/06/2015</a:t>
+              <a:t>13/06/15</a:t>
             </a:fld>
             <a:endParaRPr lang="nl-BE"/>
           </a:p>
@@ -1237,7 +1237,7 @@
           <a:p>
             <a:fld id="{D20C4439-4D20-4F39-A54D-158889AA2034}" type="datetimeFigureOut">
               <a:rPr lang="nl-BE" smtClean="0"/>
-              <a:t>13/06/2015</a:t>
+              <a:t>13/06/15</a:t>
             </a:fld>
             <a:endParaRPr lang="nl-BE"/>
           </a:p>
@@ -1604,7 +1604,7 @@
           <a:p>
             <a:fld id="{D20C4439-4D20-4F39-A54D-158889AA2034}" type="datetimeFigureOut">
               <a:rPr lang="nl-BE" smtClean="0"/>
-              <a:t>13/06/2015</a:t>
+              <a:t>13/06/15</a:t>
             </a:fld>
             <a:endParaRPr lang="nl-BE"/>
           </a:p>
@@ -1722,7 +1722,7 @@
           <a:p>
             <a:fld id="{D20C4439-4D20-4F39-A54D-158889AA2034}" type="datetimeFigureOut">
               <a:rPr lang="nl-BE" smtClean="0"/>
-              <a:t>13/06/2015</a:t>
+              <a:t>13/06/15</a:t>
             </a:fld>
             <a:endParaRPr lang="nl-BE"/>
           </a:p>
@@ -1817,7 +1817,7 @@
           <a:p>
             <a:fld id="{D20C4439-4D20-4F39-A54D-158889AA2034}" type="datetimeFigureOut">
               <a:rPr lang="nl-BE" smtClean="0"/>
-              <a:t>13/06/2015</a:t>
+              <a:t>13/06/15</a:t>
             </a:fld>
             <a:endParaRPr lang="nl-BE"/>
           </a:p>
@@ -2094,7 +2094,7 @@
           <a:p>
             <a:fld id="{D20C4439-4D20-4F39-A54D-158889AA2034}" type="datetimeFigureOut">
               <a:rPr lang="nl-BE" smtClean="0"/>
-              <a:t>13/06/2015</a:t>
+              <a:t>13/06/15</a:t>
             </a:fld>
             <a:endParaRPr lang="nl-BE"/>
           </a:p>
@@ -2347,7 +2347,7 @@
           <a:p>
             <a:fld id="{D20C4439-4D20-4F39-A54D-158889AA2034}" type="datetimeFigureOut">
               <a:rPr lang="nl-BE" smtClean="0"/>
-              <a:t>13/06/2015</a:t>
+              <a:t>13/06/15</a:t>
             </a:fld>
             <a:endParaRPr lang="nl-BE"/>
           </a:p>
@@ -2560,7 +2560,7 @@
           <a:p>
             <a:fld id="{D20C4439-4D20-4F39-A54D-158889AA2034}" type="datetimeFigureOut">
               <a:rPr lang="nl-BE" smtClean="0"/>
-              <a:t>13/06/2015</a:t>
+              <a:t>13/06/15</a:t>
             </a:fld>
             <a:endParaRPr lang="nl-BE"/>
           </a:p>
@@ -3054,8 +3054,17 @@
             </a:pPr>
             <a:r>
               <a:rPr lang="en-US" altLang="nl-BE" dirty="0" smtClean="0"/>
-              <a:t>Menu's and voting</a:t>
-            </a:r>
+              <a:t>Menus </a:t>
+            </a:r>
+            <a:r>
+              <a:rPr lang="en-US" altLang="nl-BE" dirty="0" smtClean="0"/>
+              <a:t>and </a:t>
+            </a:r>
+            <a:r>
+              <a:rPr lang="en-US" altLang="nl-BE" dirty="0" smtClean="0"/>
+              <a:t>voting for dishes</a:t>
+            </a:r>
+            <a:endParaRPr lang="en-US" altLang="nl-BE" dirty="0" smtClean="0"/>
           </a:p>
           <a:p>
             <a:pPr lvl="2">
@@ -3064,8 +3073,17 @@
             </a:pPr>
             <a:r>
               <a:rPr lang="en-US" altLang="nl-BE" dirty="0" smtClean="0"/>
-              <a:t>Picture of menu’s</a:t>
-            </a:r>
+              <a:t>Picture of </a:t>
+            </a:r>
+            <a:r>
+              <a:rPr lang="en-US" altLang="nl-BE" dirty="0" smtClean="0"/>
+              <a:t>dishes, the users can vote and </a:t>
+            </a:r>
+            <a:r>
+              <a:rPr lang="en-US" altLang="nl-BE" smtClean="0"/>
+              <a:t>provide comments</a:t>
+            </a:r>
+            <a:endParaRPr lang="en-US" altLang="nl-BE" dirty="0" smtClean="0"/>
           </a:p>
           <a:p>
             <a:pPr lvl="1">
@@ -3127,7 +3145,11 @@
             </a:pPr>
             <a:r>
               <a:rPr lang="en-US" altLang="nl-BE" dirty="0" smtClean="0"/>
-              <a:t>JavaScript</a:t>
+              <a:t>JavaScript, </a:t>
+            </a:r>
+            <a:r>
+              <a:rPr lang="en-US" altLang="nl-BE" dirty="0" err="1" smtClean="0"/>
+              <a:t>AngularJs</a:t>
             </a:r>
             <a:endParaRPr lang="en-US" altLang="nl-BE" dirty="0"/>
           </a:p>
@@ -3141,18 +3163,24 @@
             </a:pPr>
             <a:r>
               <a:rPr lang="en-US" altLang="nl-BE" dirty="0" smtClean="0"/>
-              <a:t>Initially no DB layer – JSON</a:t>
-            </a:r>
-            <a:endParaRPr lang="en-US" altLang="nl-BE" dirty="0"/>
-          </a:p>
-          <a:p>
-            <a:pPr lvl="2">
+              <a:t>Initially no DB layer – </a:t>
+            </a:r>
+            <a:r>
+              <a:rPr lang="en-US" altLang="nl-BE" dirty="0" smtClean="0"/>
+              <a:t>data from JSON</a:t>
+            </a:r>
+          </a:p>
+          <a:p>
+            <a:pPr lvl="1">
+              <a:lnSpc>
+                <a:spcPct val="90000"/>
+              </a:lnSpc>
               <a:buFontTx/>
               <a:buChar char="-"/>
             </a:pPr>
             <a:r>
               <a:rPr lang="en-US" altLang="nl-BE" dirty="0" smtClean="0"/>
-              <a:t>BUT confirmation OIB data available in case of structural need. </a:t>
+              <a:t>OIB contacted and confirmed that data feed can be automated.</a:t>
             </a:r>
             <a:endParaRPr lang="en-US" altLang="nl-BE" dirty="0"/>
           </a:p>
@@ -3566,7 +3594,7 @@
     </a:clrScheme>
     <a:fontScheme name="Office">
       <a:majorFont>
-        <a:latin typeface="Calibri Light" panose="020F0302020204030204"/>
+        <a:latin typeface="Calibri Light"/>
         <a:ea typeface=""/>
         <a:cs typeface=""/>
         <a:font script="Jpan" typeface="ＭＳ Ｐゴシック"/>
@@ -3601,7 +3629,7 @@
         <a:font script="Geor" typeface="Sylfaen"/>
       </a:majorFont>
       <a:minorFont>
-        <a:latin typeface="Calibri" panose="020F0502020204030204"/>
+        <a:latin typeface="Calibri"/>
         <a:ea typeface=""/>
         <a:cs typeface=""/>
         <a:font script="Jpan" typeface="ＭＳ Ｐゴシック"/>
@@ -3778,7 +3806,7 @@
   <a:extraClrSchemeLst/>
   <a:extLst>
     <a:ext uri="{05A4C25C-085E-4340-85A3-A5531E510DB2}">
-      <thm15:themeFamily xmlns:thm15="http://schemas.microsoft.com/office/thememl/2012/main" name="Office Theme" id="{62F939B6-93AF-4DB8-9C6B-D6C7DFDC589F}" vid="{4A3C46E8-61CC-4603-A589-7422A47A8E4A}"/>
+      <thm15:themeFamily xmlns:thm15="http://schemas.microsoft.com/office/thememl/2012/main" xmlns="" name="Office Theme" id="{62F939B6-93AF-4DB8-9C6B-D6C7DFDC589F}" vid="{4A3C46E8-61CC-4603-A589-7422A47A8E4A}"/>
     </a:ext>
   </a:extLst>
 </a:theme>

</xml_diff>

<commit_message>
added v2 of ppt
</commit_message>
<xml_diff>
--- a/Hackathlon Canteens.pptx
+++ b/Hackathlon Canteens.pptx
@@ -105,6 +105,22 @@
       </a:defRPr>
     </a:lvl9pPr>
   </p:defaultTextStyle>
+  <p:extLst>
+    <p:ext uri="{EFAFB233-063F-42B5-8137-9DF3F51BA10A}">
+      <p15:sldGuideLst xmlns:p15="http://schemas.microsoft.com/office/powerpoint/2012/main">
+        <p15:guide id="1" orient="horz" pos="2160">
+          <p15:clr>
+            <a:srgbClr val="A4A3A4"/>
+          </p15:clr>
+        </p15:guide>
+        <p15:guide id="2" pos="3840">
+          <p15:clr>
+            <a:srgbClr val="A4A3A4"/>
+          </p15:clr>
+        </p15:guide>
+      </p15:sldGuideLst>
+    </p:ext>
+  </p:extLst>
 </p:presentation>
 </file>
 
@@ -239,7 +255,7 @@
           <a:p>
             <a:fld id="{D20C4439-4D20-4F39-A54D-158889AA2034}" type="datetimeFigureOut">
               <a:rPr lang="nl-BE" smtClean="0"/>
-              <a:t>13/06/15</a:t>
+              <a:t>13/06/2015</a:t>
             </a:fld>
             <a:endParaRPr lang="nl-BE"/>
           </a:p>
@@ -409,7 +425,7 @@
           <a:p>
             <a:fld id="{D20C4439-4D20-4F39-A54D-158889AA2034}" type="datetimeFigureOut">
               <a:rPr lang="nl-BE" smtClean="0"/>
-              <a:t>13/06/15</a:t>
+              <a:t>13/06/2015</a:t>
             </a:fld>
             <a:endParaRPr lang="nl-BE"/>
           </a:p>
@@ -589,7 +605,7 @@
           <a:p>
             <a:fld id="{D20C4439-4D20-4F39-A54D-158889AA2034}" type="datetimeFigureOut">
               <a:rPr lang="nl-BE" smtClean="0"/>
-              <a:t>13/06/15</a:t>
+              <a:t>13/06/2015</a:t>
             </a:fld>
             <a:endParaRPr lang="nl-BE"/>
           </a:p>
@@ -759,7 +775,7 @@
           <a:p>
             <a:fld id="{D20C4439-4D20-4F39-A54D-158889AA2034}" type="datetimeFigureOut">
               <a:rPr lang="nl-BE" smtClean="0"/>
-              <a:t>13/06/15</a:t>
+              <a:t>13/06/2015</a:t>
             </a:fld>
             <a:endParaRPr lang="nl-BE"/>
           </a:p>
@@ -1005,7 +1021,7 @@
           <a:p>
             <a:fld id="{D20C4439-4D20-4F39-A54D-158889AA2034}" type="datetimeFigureOut">
               <a:rPr lang="nl-BE" smtClean="0"/>
-              <a:t>13/06/15</a:t>
+              <a:t>13/06/2015</a:t>
             </a:fld>
             <a:endParaRPr lang="nl-BE"/>
           </a:p>
@@ -1237,7 +1253,7 @@
           <a:p>
             <a:fld id="{D20C4439-4D20-4F39-A54D-158889AA2034}" type="datetimeFigureOut">
               <a:rPr lang="nl-BE" smtClean="0"/>
-              <a:t>13/06/15</a:t>
+              <a:t>13/06/2015</a:t>
             </a:fld>
             <a:endParaRPr lang="nl-BE"/>
           </a:p>
@@ -1604,7 +1620,7 @@
           <a:p>
             <a:fld id="{D20C4439-4D20-4F39-A54D-158889AA2034}" type="datetimeFigureOut">
               <a:rPr lang="nl-BE" smtClean="0"/>
-              <a:t>13/06/15</a:t>
+              <a:t>13/06/2015</a:t>
             </a:fld>
             <a:endParaRPr lang="nl-BE"/>
           </a:p>
@@ -1722,7 +1738,7 @@
           <a:p>
             <a:fld id="{D20C4439-4D20-4F39-A54D-158889AA2034}" type="datetimeFigureOut">
               <a:rPr lang="nl-BE" smtClean="0"/>
-              <a:t>13/06/15</a:t>
+              <a:t>13/06/2015</a:t>
             </a:fld>
             <a:endParaRPr lang="nl-BE"/>
           </a:p>
@@ -1817,7 +1833,7 @@
           <a:p>
             <a:fld id="{D20C4439-4D20-4F39-A54D-158889AA2034}" type="datetimeFigureOut">
               <a:rPr lang="nl-BE" smtClean="0"/>
-              <a:t>13/06/15</a:t>
+              <a:t>13/06/2015</a:t>
             </a:fld>
             <a:endParaRPr lang="nl-BE"/>
           </a:p>
@@ -2094,7 +2110,7 @@
           <a:p>
             <a:fld id="{D20C4439-4D20-4F39-A54D-158889AA2034}" type="datetimeFigureOut">
               <a:rPr lang="nl-BE" smtClean="0"/>
-              <a:t>13/06/15</a:t>
+              <a:t>13/06/2015</a:t>
             </a:fld>
             <a:endParaRPr lang="nl-BE"/>
           </a:p>
@@ -2347,7 +2363,7 @@
           <a:p>
             <a:fld id="{D20C4439-4D20-4F39-A54D-158889AA2034}" type="datetimeFigureOut">
               <a:rPr lang="nl-BE" smtClean="0"/>
-              <a:t>13/06/15</a:t>
+              <a:t>13/06/2015</a:t>
             </a:fld>
             <a:endParaRPr lang="nl-BE"/>
           </a:p>
@@ -2560,7 +2576,7 @@
           <a:p>
             <a:fld id="{D20C4439-4D20-4F39-A54D-158889AA2034}" type="datetimeFigureOut">
               <a:rPr lang="nl-BE" smtClean="0"/>
-              <a:t>13/06/15</a:t>
+              <a:t>13/06/2015</a:t>
             </a:fld>
             <a:endParaRPr lang="nl-BE"/>
           </a:p>
@@ -3054,17 +3070,8 @@
             </a:pPr>
             <a:r>
               <a:rPr lang="en-US" altLang="nl-BE" dirty="0" smtClean="0"/>
-              <a:t>Menus </a:t>
-            </a:r>
-            <a:r>
-              <a:rPr lang="en-US" altLang="nl-BE" dirty="0" smtClean="0"/>
-              <a:t>and </a:t>
-            </a:r>
-            <a:r>
-              <a:rPr lang="en-US" altLang="nl-BE" dirty="0" smtClean="0"/>
-              <a:t>voting for dishes</a:t>
-            </a:r>
-            <a:endParaRPr lang="en-US" altLang="nl-BE" dirty="0" smtClean="0"/>
+              <a:t>Menus and voting for dishes</a:t>
+            </a:r>
           </a:p>
           <a:p>
             <a:pPr lvl="2">
@@ -3073,17 +3080,8 @@
             </a:pPr>
             <a:r>
               <a:rPr lang="en-US" altLang="nl-BE" dirty="0" smtClean="0"/>
-              <a:t>Picture of </a:t>
-            </a:r>
-            <a:r>
-              <a:rPr lang="en-US" altLang="nl-BE" dirty="0" smtClean="0"/>
-              <a:t>dishes, the users can vote and </a:t>
-            </a:r>
-            <a:r>
-              <a:rPr lang="en-US" altLang="nl-BE" smtClean="0"/>
-              <a:t>provide comments</a:t>
-            </a:r>
-            <a:endParaRPr lang="en-US" altLang="nl-BE" dirty="0" smtClean="0"/>
+              <a:t>Picture of dishes, the users can vote and provide comments</a:t>
+            </a:r>
           </a:p>
           <a:p>
             <a:pPr lvl="1">
@@ -3163,11 +3161,7 @@
             </a:pPr>
             <a:r>
               <a:rPr lang="en-US" altLang="nl-BE" dirty="0" smtClean="0"/>
-              <a:t>Initially no DB layer – </a:t>
-            </a:r>
-            <a:r>
-              <a:rPr lang="en-US" altLang="nl-BE" dirty="0" smtClean="0"/>
-              <a:t>data from JSON</a:t>
+              <a:t>Initially no DB layer – data from JSON</a:t>
             </a:r>
           </a:p>
           <a:p>
@@ -3806,7 +3800,7 @@
   <a:extraClrSchemeLst/>
   <a:extLst>
     <a:ext uri="{05A4C25C-085E-4340-85A3-A5531E510DB2}">
-      <thm15:themeFamily xmlns:thm15="http://schemas.microsoft.com/office/thememl/2012/main" xmlns="" name="Office Theme" id="{62F939B6-93AF-4DB8-9C6B-D6C7DFDC589F}" vid="{4A3C46E8-61CC-4603-A589-7422A47A8E4A}"/>
+      <thm15:themeFamily xmlns:thm15="http://schemas.microsoft.com/office/thememl/2012/main" name="Office Theme" id="{62F939B6-93AF-4DB8-9C6B-D6C7DFDC589F}" vid="{4A3C46E8-61CC-4603-A589-7422A47A8E4A}"/>
     </a:ext>
   </a:extLst>
 </a:theme>

</xml_diff>